<commit_message>
final version for real this time
</commit_message>
<xml_diff>
--- a/Presentation.pptx
+++ b/Presentation.pptx
@@ -460,7 +460,7 @@
           <a:p>
             <a:fld id="{C1E34047-EA58-134A-B286-18BF7AC2C690}" type="datetimeFigureOut">
               <a:rPr lang="en-US" smtClean="0"/>
-              <a:t>9/15/24</a:t>
+              <a:t>9/22/24</a:t>
             </a:fld>
             <a:endParaRPr lang="en-US"/>
           </a:p>
@@ -11793,7 +11793,7 @@
           <a:p>
             <a:fld id="{02EABCE6-4E1F-4440-BD2E-1908BCC61C3F}" type="datetimeFigureOut">
               <a:rPr lang="en-US" smtClean="0"/>
-              <a:t>9/15/24</a:t>
+              <a:t>9/22/24</a:t>
             </a:fld>
             <a:endParaRPr lang="en-US"/>
           </a:p>
@@ -11963,7 +11963,7 @@
           <a:p>
             <a:fld id="{02EABCE6-4E1F-4440-BD2E-1908BCC61C3F}" type="datetimeFigureOut">
               <a:rPr lang="en-US" smtClean="0"/>
-              <a:t>9/15/24</a:t>
+              <a:t>9/22/24</a:t>
             </a:fld>
             <a:endParaRPr lang="en-US"/>
           </a:p>
@@ -12143,7 +12143,7 @@
           <a:p>
             <a:fld id="{02EABCE6-4E1F-4440-BD2E-1908BCC61C3F}" type="datetimeFigureOut">
               <a:rPr lang="en-US" smtClean="0"/>
-              <a:t>9/15/24</a:t>
+              <a:t>9/22/24</a:t>
             </a:fld>
             <a:endParaRPr lang="en-US"/>
           </a:p>
@@ -12313,7 +12313,7 @@
           <a:p>
             <a:fld id="{02EABCE6-4E1F-4440-BD2E-1908BCC61C3F}" type="datetimeFigureOut">
               <a:rPr lang="en-US" smtClean="0"/>
-              <a:t>9/15/24</a:t>
+              <a:t>9/22/24</a:t>
             </a:fld>
             <a:endParaRPr lang="en-US"/>
           </a:p>
@@ -12559,7 +12559,7 @@
           <a:p>
             <a:fld id="{02EABCE6-4E1F-4440-BD2E-1908BCC61C3F}" type="datetimeFigureOut">
               <a:rPr lang="en-US" smtClean="0"/>
-              <a:t>9/15/24</a:t>
+              <a:t>9/22/24</a:t>
             </a:fld>
             <a:endParaRPr lang="en-US"/>
           </a:p>
@@ -12791,7 +12791,7 @@
           <a:p>
             <a:fld id="{02EABCE6-4E1F-4440-BD2E-1908BCC61C3F}" type="datetimeFigureOut">
               <a:rPr lang="en-US" smtClean="0"/>
-              <a:t>9/15/24</a:t>
+              <a:t>9/22/24</a:t>
             </a:fld>
             <a:endParaRPr lang="en-US"/>
           </a:p>
@@ -13158,7 +13158,7 @@
           <a:p>
             <a:fld id="{02EABCE6-4E1F-4440-BD2E-1908BCC61C3F}" type="datetimeFigureOut">
               <a:rPr lang="en-US" smtClean="0"/>
-              <a:t>9/15/24</a:t>
+              <a:t>9/22/24</a:t>
             </a:fld>
             <a:endParaRPr lang="en-US"/>
           </a:p>
@@ -13276,7 +13276,7 @@
           <a:p>
             <a:fld id="{02EABCE6-4E1F-4440-BD2E-1908BCC61C3F}" type="datetimeFigureOut">
               <a:rPr lang="en-US" smtClean="0"/>
-              <a:t>9/15/24</a:t>
+              <a:t>9/22/24</a:t>
             </a:fld>
             <a:endParaRPr lang="en-US"/>
           </a:p>
@@ -13371,7 +13371,7 @@
           <a:p>
             <a:fld id="{02EABCE6-4E1F-4440-BD2E-1908BCC61C3F}" type="datetimeFigureOut">
               <a:rPr lang="en-US" smtClean="0"/>
-              <a:t>9/15/24</a:t>
+              <a:t>9/22/24</a:t>
             </a:fld>
             <a:endParaRPr lang="en-US"/>
           </a:p>
@@ -13648,7 +13648,7 @@
           <a:p>
             <a:fld id="{02EABCE6-4E1F-4440-BD2E-1908BCC61C3F}" type="datetimeFigureOut">
               <a:rPr lang="en-US" smtClean="0"/>
-              <a:t>9/15/24</a:t>
+              <a:t>9/22/24</a:t>
             </a:fld>
             <a:endParaRPr lang="en-US"/>
           </a:p>
@@ -13905,7 +13905,7 @@
           <a:p>
             <a:fld id="{02EABCE6-4E1F-4440-BD2E-1908BCC61C3F}" type="datetimeFigureOut">
               <a:rPr lang="en-US" smtClean="0"/>
-              <a:t>9/15/24</a:t>
+              <a:t>9/22/24</a:t>
             </a:fld>
             <a:endParaRPr lang="en-US"/>
           </a:p>
@@ -14118,7 +14118,7 @@
           <a:p>
             <a:fld id="{02EABCE6-4E1F-4440-BD2E-1908BCC61C3F}" type="datetimeFigureOut">
               <a:rPr lang="en-US" smtClean="0"/>
-              <a:t>9/15/24</a:t>
+              <a:t>9/22/24</a:t>
             </a:fld>
             <a:endParaRPr lang="en-US"/>
           </a:p>
@@ -19829,7 +19829,7 @@
           <a:p>
             <a:r>
               <a:rPr lang="en-US" dirty="0"/>
-              <a:t>Other Sectors / Industries</a:t>
+              <a:t>Sectors / Industries</a:t>
             </a:r>
           </a:p>
         </p:txBody>
@@ -20711,34 +20711,6 @@
           <a:chExt cx="0" cy="0"/>
         </a:xfrm>
       </p:grpSpPr>
-      <p:sp>
-        <p:nvSpPr>
-          <p:cNvPr id="2" name="Title 1">
-            <a:extLst>
-              <a:ext uri="{FF2B5EF4-FFF2-40B4-BE49-F238E27FC236}">
-                <a16:creationId xmlns:a16="http://schemas.microsoft.com/office/drawing/2014/main" id="{060C4091-615A-5D13-0C81-0D0BDE02F2D5}"/>
-              </a:ext>
-            </a:extLst>
-          </p:cNvPr>
-          <p:cNvSpPr>
-            <a:spLocks noGrp="1"/>
-          </p:cNvSpPr>
-          <p:nvPr>
-            <p:ph type="title"/>
-          </p:nvPr>
-        </p:nvSpPr>
-        <p:spPr/>
-        <p:txBody>
-          <a:bodyPr/>
-          <a:lstStyle/>
-          <a:p>
-            <a:r>
-              <a:rPr lang="en-US" dirty="0"/>
-              <a:t>Question 3</a:t>
-            </a:r>
-          </a:p>
-        </p:txBody>
-      </p:sp>
       <p:pic>
         <p:nvPicPr>
           <p:cNvPr id="6" name="Picture 5">
@@ -20948,6 +20920,31 @@
               </a:rPr>
               <a:t>What IP Address?</a:t>
             </a:r>
+          </a:p>
+        </p:txBody>
+      </p:sp>
+      <p:sp>
+        <p:nvSpPr>
+          <p:cNvPr id="9" name="Title 8">
+            <a:extLst>
+              <a:ext uri="{FF2B5EF4-FFF2-40B4-BE49-F238E27FC236}">
+                <a16:creationId xmlns:a16="http://schemas.microsoft.com/office/drawing/2014/main" id="{D45EFB35-FF8F-FC4F-76CD-52E58391F319}"/>
+              </a:ext>
+            </a:extLst>
+          </p:cNvPr>
+          <p:cNvSpPr>
+            <a:spLocks noGrp="1"/>
+          </p:cNvSpPr>
+          <p:nvPr>
+            <p:ph type="title"/>
+          </p:nvPr>
+        </p:nvSpPr>
+        <p:spPr/>
+        <p:txBody>
+          <a:bodyPr/>
+          <a:lstStyle/>
+          <a:p>
+            <a:endParaRPr lang="en-US"/>
           </a:p>
         </p:txBody>
       </p:sp>
@@ -21350,34 +21347,6 @@
       </p:grpSpPr>
       <p:sp>
         <p:nvSpPr>
-          <p:cNvPr id="2" name="Title 1">
-            <a:extLst>
-              <a:ext uri="{FF2B5EF4-FFF2-40B4-BE49-F238E27FC236}">
-                <a16:creationId xmlns:a16="http://schemas.microsoft.com/office/drawing/2014/main" id="{060C4091-615A-5D13-0C81-0D0BDE02F2D5}"/>
-              </a:ext>
-            </a:extLst>
-          </p:cNvPr>
-          <p:cNvSpPr>
-            <a:spLocks noGrp="1"/>
-          </p:cNvSpPr>
-          <p:nvPr>
-            <p:ph type="title"/>
-          </p:nvPr>
-        </p:nvSpPr>
-        <p:spPr/>
-        <p:txBody>
-          <a:bodyPr/>
-          <a:lstStyle/>
-          <a:p>
-            <a:r>
-              <a:rPr lang="en-US" dirty="0"/>
-              <a:t>Question 4</a:t>
-            </a:r>
-          </a:p>
-        </p:txBody>
-      </p:sp>
-      <p:sp>
-        <p:nvSpPr>
           <p:cNvPr id="3" name="Content Placeholder 2">
             <a:extLst>
               <a:ext uri="{FF2B5EF4-FFF2-40B4-BE49-F238E27FC236}">
@@ -21431,6 +21400,31 @@
           </a:prstGeom>
         </p:spPr>
       </p:pic>
+      <p:sp>
+        <p:nvSpPr>
+          <p:cNvPr id="6" name="Title 5">
+            <a:extLst>
+              <a:ext uri="{FF2B5EF4-FFF2-40B4-BE49-F238E27FC236}">
+                <a16:creationId xmlns:a16="http://schemas.microsoft.com/office/drawing/2014/main" id="{45754899-2BBF-ADD2-4830-17BF32F9A6F2}"/>
+              </a:ext>
+            </a:extLst>
+          </p:cNvPr>
+          <p:cNvSpPr>
+            <a:spLocks noGrp="1"/>
+          </p:cNvSpPr>
+          <p:nvPr>
+            <p:ph type="title"/>
+          </p:nvPr>
+        </p:nvSpPr>
+        <p:spPr/>
+        <p:txBody>
+          <a:bodyPr/>
+          <a:lstStyle/>
+          <a:p>
+            <a:endParaRPr lang="en-US"/>
+          </a:p>
+        </p:txBody>
+      </p:sp>
     </p:spTree>
     <p:extLst>
       <p:ext uri="{BB962C8B-B14F-4D97-AF65-F5344CB8AC3E}">
@@ -26129,7 +26123,7 @@
           <a:p>
             <a:r>
               <a:rPr lang="en-US" sz="3600" dirty="0"/>
-              <a:t>Server Admin</a:t>
+              <a:t>Server Administrator</a:t>
             </a:r>
           </a:p>
         </p:txBody>

</xml_diff>